<commit_message>
PPT file for presentation
</commit_message>
<xml_diff>
--- a/Team 2 presentation - climate change.pptx
+++ b/Team 2 presentation - climate change.pptx
@@ -4418,429 +4418,533 @@
         </p:nvSpPr>
         <p:spPr>
           <a:xfrm>
-            <a:off x="838200" y="1825625"/>
-            <a:ext cx="4936740" cy="4351338"/>
+            <a:off x="673768" y="1443789"/>
+            <a:ext cx="5092738" cy="5165558"/>
           </a:xfrm>
         </p:spPr>
         <p:txBody>
           <a:bodyPr>
-            <a:normAutofit fontScale="62500" lnSpcReduction="20000"/>
+            <a:noAutofit/>
           </a:bodyPr>
           <a:lstStyle/>
           <a:p>
+            <a:pPr>
+              <a:lnSpc>
+                <a:spcPct val="170000"/>
+              </a:lnSpc>
+            </a:pPr>
+            <a:r>
+              <a:rPr lang="en-US" sz="1800" dirty="0"/>
+              <a:t>Discussions around climate change have become increasingly frequent and urgent across the globe. While there are groups of people (including politicians) who are </a:t>
+            </a:r>
+            <a:r>
+              <a:rPr lang="en-US" sz="1800" dirty="0" err="1"/>
+              <a:t>sceptical</a:t>
+            </a:r>
+            <a:r>
+              <a:rPr lang="en-US" sz="1800" dirty="0"/>
+              <a:t> of climate change, a data-driven approach reveals that there is no doubting that we are in an era of global warming. </a:t>
+            </a:r>
+            <a:endParaRPr lang="en-US" sz="1800" dirty="0" smtClean="0"/>
+          </a:p>
+          <a:p>
+            <a:pPr>
+              <a:lnSpc>
+                <a:spcPct val="170000"/>
+              </a:lnSpc>
+            </a:pPr>
+            <a:r>
+              <a:rPr lang="en-US" sz="1800" dirty="0" smtClean="0"/>
+              <a:t>This </a:t>
+            </a:r>
+            <a:r>
+              <a:rPr lang="en-US" sz="1800" dirty="0"/>
+              <a:t>dataset has given us an opportunity to apply our learnings from this course to a topic that is very relevant in our lives, and to uncover firsthand the realities of climate change. </a:t>
+            </a:r>
+            <a:endParaRPr lang="en-GB" sz="1400" dirty="0" smtClean="0"/>
+          </a:p>
+          <a:p>
             <a:pPr marL="0" indent="0">
               <a:lnSpc>
-                <a:spcPct val="120000"/>
+                <a:spcPct val="170000"/>
               </a:lnSpc>
               <a:buNone/>
             </a:pPr>
-            <a:r>
-              <a:rPr lang="en-US" dirty="0"/>
-              <a:t>Discussions around climate change have become increasingly frequent and urgent across the globe. While there are groups of people (including politicians) who are </a:t>
-            </a:r>
-            <a:r>
-              <a:rPr lang="en-US" dirty="0" err="1"/>
-              <a:t>sceptical</a:t>
-            </a:r>
-            <a:r>
-              <a:rPr lang="en-US" dirty="0"/>
-              <a:t> of climate change, a data-driven approach reveals that there is no doubting that we are in an era of global warming. This dataset has given us an opportunity to apply our learnings from this course to a topic that is very relevant in our lives, and to uncover firsthand the realities of climate change. Using this dataset we explored XXXXXXX COMPLETE THIS SENTENCE LAST, ONCE WE HAVE A BETTER SENSE OF OUR ANALYSIS </a:t>
-            </a:r>
-            <a:r>
-              <a:rPr lang="en-US" dirty="0" err="1"/>
-              <a:t>xxxxx</a:t>
-            </a:r>
-            <a:r>
-              <a:rPr lang="en-US" dirty="0"/>
-              <a:t>.</a:t>
-            </a:r>
-            <a:endParaRPr lang="en-GB" sz="2000" dirty="0" smtClean="0"/>
-          </a:p>
-          <a:p>
-            <a:pPr marL="0" indent="0">
-              <a:lnSpc>
-                <a:spcPct val="120000"/>
-              </a:lnSpc>
-              <a:buNone/>
-            </a:pPr>
-            <a:endParaRPr lang="en-GB" sz="2000" dirty="0"/>
+            <a:endParaRPr lang="en-GB" sz="1400" dirty="0"/>
           </a:p>
         </p:txBody>
       </p:sp>
-      <p:sp>
-        <p:nvSpPr>
-          <p:cNvPr id="4" name="Marcador de contenido 2"/>
-          <p:cNvSpPr txBox="1">
-            <a:spLocks/>
-          </p:cNvSpPr>
+      <p:grpSp>
+        <p:nvGrpSpPr>
+          <p:cNvPr id="5" name="Grupo 4"/>
+          <p:cNvGrpSpPr/>
           <p:nvPr/>
-        </p:nvSpPr>
-        <p:spPr>
+        </p:nvGrpSpPr>
+        <p:grpSpPr>
           <a:xfrm>
-            <a:off x="6130834" y="1825625"/>
-            <a:ext cx="5222966" cy="4351338"/>
+            <a:off x="5736584" y="1010653"/>
+            <a:ext cx="5992132" cy="5325978"/>
+            <a:chOff x="5165082" y="457086"/>
+            <a:chExt cx="6435298" cy="5719877"/>
           </a:xfrm>
-          <a:prstGeom prst="rect">
-            <a:avLst/>
-          </a:prstGeom>
-        </p:spPr>
-        <p:txBody>
-          <a:bodyPr vert="horz" lIns="91440" tIns="45720" rIns="91440" bIns="45720" rtlCol="0">
-            <a:normAutofit/>
-          </a:bodyPr>
-          <a:lstStyle>
-            <a:lvl1pPr marL="228600" indent="-228600" algn="l" defTabSz="914400" rtl="0" eaLnBrk="1" latinLnBrk="0" hangingPunct="1">
-              <a:lnSpc>
-                <a:spcPct val="90000"/>
-              </a:lnSpc>
-              <a:spcBef>
-                <a:spcPts val="1000"/>
-              </a:spcBef>
-              <a:buFont typeface="Arial" panose="020B0604020202020204" pitchFamily="34" charset="0"/>
-              <a:buChar char="•"/>
-              <a:defRPr sz="2800" kern="1200">
-                <a:solidFill>
-                  <a:schemeClr val="tx1"/>
-                </a:solidFill>
-                <a:latin typeface="+mn-lt"/>
-                <a:ea typeface="+mn-ea"/>
-                <a:cs typeface="+mn-cs"/>
-              </a:defRPr>
-            </a:lvl1pPr>
-            <a:lvl2pPr marL="685800" indent="-228600" algn="l" defTabSz="914400" rtl="0" eaLnBrk="1" latinLnBrk="0" hangingPunct="1">
-              <a:lnSpc>
-                <a:spcPct val="90000"/>
-              </a:lnSpc>
-              <a:spcBef>
-                <a:spcPts val="500"/>
-              </a:spcBef>
-              <a:buFont typeface="Arial" panose="020B0604020202020204" pitchFamily="34" charset="0"/>
-              <a:buChar char="•"/>
-              <a:defRPr sz="2400" kern="1200">
-                <a:solidFill>
-                  <a:schemeClr val="tx1"/>
-                </a:solidFill>
-                <a:latin typeface="+mn-lt"/>
-                <a:ea typeface="+mn-ea"/>
-                <a:cs typeface="+mn-cs"/>
-              </a:defRPr>
-            </a:lvl2pPr>
-            <a:lvl3pPr marL="1143000" indent="-228600" algn="l" defTabSz="914400" rtl="0" eaLnBrk="1" latinLnBrk="0" hangingPunct="1">
-              <a:lnSpc>
-                <a:spcPct val="90000"/>
-              </a:lnSpc>
-              <a:spcBef>
-                <a:spcPts val="500"/>
-              </a:spcBef>
-              <a:buFont typeface="Arial" panose="020B0604020202020204" pitchFamily="34" charset="0"/>
-              <a:buChar char="•"/>
-              <a:defRPr sz="2000" kern="1200">
-                <a:solidFill>
-                  <a:schemeClr val="tx1"/>
-                </a:solidFill>
-                <a:latin typeface="+mn-lt"/>
-                <a:ea typeface="+mn-ea"/>
-                <a:cs typeface="+mn-cs"/>
-              </a:defRPr>
-            </a:lvl3pPr>
-            <a:lvl4pPr marL="1600200" indent="-228600" algn="l" defTabSz="914400" rtl="0" eaLnBrk="1" latinLnBrk="0" hangingPunct="1">
-              <a:lnSpc>
-                <a:spcPct val="90000"/>
-              </a:lnSpc>
-              <a:spcBef>
-                <a:spcPts val="500"/>
-              </a:spcBef>
-              <a:buFont typeface="Arial" panose="020B0604020202020204" pitchFamily="34" charset="0"/>
-              <a:buChar char="•"/>
-              <a:defRPr sz="1800" kern="1200">
-                <a:solidFill>
-                  <a:schemeClr val="tx1"/>
-                </a:solidFill>
-                <a:latin typeface="+mn-lt"/>
-                <a:ea typeface="+mn-ea"/>
-                <a:cs typeface="+mn-cs"/>
-              </a:defRPr>
-            </a:lvl4pPr>
-            <a:lvl5pPr marL="2057400" indent="-228600" algn="l" defTabSz="914400" rtl="0" eaLnBrk="1" latinLnBrk="0" hangingPunct="1">
-              <a:lnSpc>
-                <a:spcPct val="90000"/>
-              </a:lnSpc>
-              <a:spcBef>
-                <a:spcPts val="500"/>
-              </a:spcBef>
-              <a:buFont typeface="Arial" panose="020B0604020202020204" pitchFamily="34" charset="0"/>
-              <a:buChar char="•"/>
-              <a:defRPr sz="1800" kern="1200">
-                <a:solidFill>
-                  <a:schemeClr val="tx1"/>
-                </a:solidFill>
-                <a:latin typeface="+mn-lt"/>
-                <a:ea typeface="+mn-ea"/>
-                <a:cs typeface="+mn-cs"/>
-              </a:defRPr>
-            </a:lvl5pPr>
-            <a:lvl6pPr marL="2514600" indent="-228600" algn="l" defTabSz="914400" rtl="0" eaLnBrk="1" latinLnBrk="0" hangingPunct="1">
-              <a:lnSpc>
-                <a:spcPct val="90000"/>
-              </a:lnSpc>
-              <a:spcBef>
-                <a:spcPts val="500"/>
-              </a:spcBef>
-              <a:buFont typeface="Arial" panose="020B0604020202020204" pitchFamily="34" charset="0"/>
-              <a:buChar char="•"/>
-              <a:defRPr sz="1800" kern="1200">
-                <a:solidFill>
-                  <a:schemeClr val="tx1"/>
-                </a:solidFill>
-                <a:latin typeface="+mn-lt"/>
-                <a:ea typeface="+mn-ea"/>
-                <a:cs typeface="+mn-cs"/>
-              </a:defRPr>
-            </a:lvl6pPr>
-            <a:lvl7pPr marL="2971800" indent="-228600" algn="l" defTabSz="914400" rtl="0" eaLnBrk="1" latinLnBrk="0" hangingPunct="1">
-              <a:lnSpc>
-                <a:spcPct val="90000"/>
-              </a:lnSpc>
-              <a:spcBef>
-                <a:spcPts val="500"/>
-              </a:spcBef>
-              <a:buFont typeface="Arial" panose="020B0604020202020204" pitchFamily="34" charset="0"/>
-              <a:buChar char="•"/>
-              <a:defRPr sz="1800" kern="1200">
-                <a:solidFill>
-                  <a:schemeClr val="tx1"/>
-                </a:solidFill>
-                <a:latin typeface="+mn-lt"/>
-                <a:ea typeface="+mn-ea"/>
-                <a:cs typeface="+mn-cs"/>
-              </a:defRPr>
-            </a:lvl7pPr>
-            <a:lvl8pPr marL="3429000" indent="-228600" algn="l" defTabSz="914400" rtl="0" eaLnBrk="1" latinLnBrk="0" hangingPunct="1">
-              <a:lnSpc>
-                <a:spcPct val="90000"/>
-              </a:lnSpc>
-              <a:spcBef>
-                <a:spcPts val="500"/>
-              </a:spcBef>
-              <a:buFont typeface="Arial" panose="020B0604020202020204" pitchFamily="34" charset="0"/>
-              <a:buChar char="•"/>
-              <a:defRPr sz="1800" kern="1200">
-                <a:solidFill>
-                  <a:schemeClr val="tx1"/>
-                </a:solidFill>
-                <a:latin typeface="+mn-lt"/>
-                <a:ea typeface="+mn-ea"/>
-                <a:cs typeface="+mn-cs"/>
-              </a:defRPr>
-            </a:lvl8pPr>
-            <a:lvl9pPr marL="3886200" indent="-228600" algn="l" defTabSz="914400" rtl="0" eaLnBrk="1" latinLnBrk="0" hangingPunct="1">
-              <a:lnSpc>
-                <a:spcPct val="90000"/>
-              </a:lnSpc>
-              <a:spcBef>
-                <a:spcPts val="500"/>
-              </a:spcBef>
-              <a:buFont typeface="Arial" panose="020B0604020202020204" pitchFamily="34" charset="0"/>
-              <a:buChar char="•"/>
-              <a:defRPr sz="1800" kern="1200">
-                <a:solidFill>
-                  <a:schemeClr val="tx1"/>
-                </a:solidFill>
-                <a:latin typeface="+mn-lt"/>
-                <a:ea typeface="+mn-ea"/>
-                <a:cs typeface="+mn-cs"/>
-              </a:defRPr>
-            </a:lvl9pPr>
-          </a:lstStyle>
-          <a:p>
-            <a:pPr marL="0" indent="0">
-              <a:buNone/>
-            </a:pPr>
-            <a:endParaRPr lang="en-GB" sz="2000" dirty="0" smtClean="0"/>
-          </a:p>
-          <a:p>
-            <a:pPr marL="0" indent="0">
-              <a:buFont typeface="Arial" panose="020B0604020202020204" pitchFamily="34" charset="0"/>
-              <a:buNone/>
-            </a:pPr>
-            <a:endParaRPr lang="en-GB" sz="2000" dirty="0" smtClean="0"/>
-          </a:p>
-          <a:p>
-            <a:pPr marL="0" indent="0">
-              <a:buFont typeface="Arial" panose="020B0604020202020204" pitchFamily="34" charset="0"/>
-              <a:buNone/>
-            </a:pPr>
-            <a:endParaRPr lang="en-US" sz="2000" dirty="0"/>
-          </a:p>
-        </p:txBody>
-      </p:sp>
-      <p:pic>
-        <p:nvPicPr>
-          <p:cNvPr id="1026" name="Picture 2" descr="Image result for CLIMATE CHANGE"/>
-          <p:cNvPicPr>
-            <a:picLocks noChangeAspect="1" noChangeArrowheads="1"/>
-          </p:cNvPicPr>
-          <p:nvPr/>
-        </p:nvPicPr>
-        <p:blipFill>
-          <a:blip r:embed="rId2" cstate="print">
+        </p:grpSpPr>
+        <p:sp>
+          <p:nvSpPr>
+            <p:cNvPr id="4" name="Marcador de contenido 2"/>
+            <p:cNvSpPr txBox="1">
+              <a:spLocks/>
+            </p:cNvSpPr>
+            <p:nvPr/>
+          </p:nvSpPr>
+          <p:spPr>
+            <a:xfrm>
+              <a:off x="6130834" y="1825625"/>
+              <a:ext cx="5222966" cy="4351338"/>
+            </a:xfrm>
+            <a:prstGeom prst="rect">
+              <a:avLst/>
+            </a:prstGeom>
+          </p:spPr>
+          <p:txBody>
+            <a:bodyPr vert="horz" lIns="91440" tIns="45720" rIns="91440" bIns="45720" rtlCol="0">
+              <a:normAutofit/>
+            </a:bodyPr>
+            <a:lstStyle>
+              <a:lvl1pPr marL="228600" indent="-228600" algn="l" defTabSz="914400" rtl="0" eaLnBrk="1" latinLnBrk="0" hangingPunct="1">
+                <a:lnSpc>
+                  <a:spcPct val="90000"/>
+                </a:lnSpc>
+                <a:spcBef>
+                  <a:spcPts val="1000"/>
+                </a:spcBef>
+                <a:buFont typeface="Arial" panose="020B0604020202020204" pitchFamily="34" charset="0"/>
+                <a:buChar char="•"/>
+                <a:defRPr sz="2800" kern="1200">
+                  <a:solidFill>
+                    <a:schemeClr val="tx1"/>
+                  </a:solidFill>
+                  <a:latin typeface="+mn-lt"/>
+                  <a:ea typeface="+mn-ea"/>
+                  <a:cs typeface="+mn-cs"/>
+                </a:defRPr>
+              </a:lvl1pPr>
+              <a:lvl2pPr marL="685800" indent="-228600" algn="l" defTabSz="914400" rtl="0" eaLnBrk="1" latinLnBrk="0" hangingPunct="1">
+                <a:lnSpc>
+                  <a:spcPct val="90000"/>
+                </a:lnSpc>
+                <a:spcBef>
+                  <a:spcPts val="500"/>
+                </a:spcBef>
+                <a:buFont typeface="Arial" panose="020B0604020202020204" pitchFamily="34" charset="0"/>
+                <a:buChar char="•"/>
+                <a:defRPr sz="2400" kern="1200">
+                  <a:solidFill>
+                    <a:schemeClr val="tx1"/>
+                  </a:solidFill>
+                  <a:latin typeface="+mn-lt"/>
+                  <a:ea typeface="+mn-ea"/>
+                  <a:cs typeface="+mn-cs"/>
+                </a:defRPr>
+              </a:lvl2pPr>
+              <a:lvl3pPr marL="1143000" indent="-228600" algn="l" defTabSz="914400" rtl="0" eaLnBrk="1" latinLnBrk="0" hangingPunct="1">
+                <a:lnSpc>
+                  <a:spcPct val="90000"/>
+                </a:lnSpc>
+                <a:spcBef>
+                  <a:spcPts val="500"/>
+                </a:spcBef>
+                <a:buFont typeface="Arial" panose="020B0604020202020204" pitchFamily="34" charset="0"/>
+                <a:buChar char="•"/>
+                <a:defRPr sz="2000" kern="1200">
+                  <a:solidFill>
+                    <a:schemeClr val="tx1"/>
+                  </a:solidFill>
+                  <a:latin typeface="+mn-lt"/>
+                  <a:ea typeface="+mn-ea"/>
+                  <a:cs typeface="+mn-cs"/>
+                </a:defRPr>
+              </a:lvl3pPr>
+              <a:lvl4pPr marL="1600200" indent="-228600" algn="l" defTabSz="914400" rtl="0" eaLnBrk="1" latinLnBrk="0" hangingPunct="1">
+                <a:lnSpc>
+                  <a:spcPct val="90000"/>
+                </a:lnSpc>
+                <a:spcBef>
+                  <a:spcPts val="500"/>
+                </a:spcBef>
+                <a:buFont typeface="Arial" panose="020B0604020202020204" pitchFamily="34" charset="0"/>
+                <a:buChar char="•"/>
+                <a:defRPr sz="1800" kern="1200">
+                  <a:solidFill>
+                    <a:schemeClr val="tx1"/>
+                  </a:solidFill>
+                  <a:latin typeface="+mn-lt"/>
+                  <a:ea typeface="+mn-ea"/>
+                  <a:cs typeface="+mn-cs"/>
+                </a:defRPr>
+              </a:lvl4pPr>
+              <a:lvl5pPr marL="2057400" indent="-228600" algn="l" defTabSz="914400" rtl="0" eaLnBrk="1" latinLnBrk="0" hangingPunct="1">
+                <a:lnSpc>
+                  <a:spcPct val="90000"/>
+                </a:lnSpc>
+                <a:spcBef>
+                  <a:spcPts val="500"/>
+                </a:spcBef>
+                <a:buFont typeface="Arial" panose="020B0604020202020204" pitchFamily="34" charset="0"/>
+                <a:buChar char="•"/>
+                <a:defRPr sz="1800" kern="1200">
+                  <a:solidFill>
+                    <a:schemeClr val="tx1"/>
+                  </a:solidFill>
+                  <a:latin typeface="+mn-lt"/>
+                  <a:ea typeface="+mn-ea"/>
+                  <a:cs typeface="+mn-cs"/>
+                </a:defRPr>
+              </a:lvl5pPr>
+              <a:lvl6pPr marL="2514600" indent="-228600" algn="l" defTabSz="914400" rtl="0" eaLnBrk="1" latinLnBrk="0" hangingPunct="1">
+                <a:lnSpc>
+                  <a:spcPct val="90000"/>
+                </a:lnSpc>
+                <a:spcBef>
+                  <a:spcPts val="500"/>
+                </a:spcBef>
+                <a:buFont typeface="Arial" panose="020B0604020202020204" pitchFamily="34" charset="0"/>
+                <a:buChar char="•"/>
+                <a:defRPr sz="1800" kern="1200">
+                  <a:solidFill>
+                    <a:schemeClr val="tx1"/>
+                  </a:solidFill>
+                  <a:latin typeface="+mn-lt"/>
+                  <a:ea typeface="+mn-ea"/>
+                  <a:cs typeface="+mn-cs"/>
+                </a:defRPr>
+              </a:lvl6pPr>
+              <a:lvl7pPr marL="2971800" indent="-228600" algn="l" defTabSz="914400" rtl="0" eaLnBrk="1" latinLnBrk="0" hangingPunct="1">
+                <a:lnSpc>
+                  <a:spcPct val="90000"/>
+                </a:lnSpc>
+                <a:spcBef>
+                  <a:spcPts val="500"/>
+                </a:spcBef>
+                <a:buFont typeface="Arial" panose="020B0604020202020204" pitchFamily="34" charset="0"/>
+                <a:buChar char="•"/>
+                <a:defRPr sz="1800" kern="1200">
+                  <a:solidFill>
+                    <a:schemeClr val="tx1"/>
+                  </a:solidFill>
+                  <a:latin typeface="+mn-lt"/>
+                  <a:ea typeface="+mn-ea"/>
+                  <a:cs typeface="+mn-cs"/>
+                </a:defRPr>
+              </a:lvl7pPr>
+              <a:lvl8pPr marL="3429000" indent="-228600" algn="l" defTabSz="914400" rtl="0" eaLnBrk="1" latinLnBrk="0" hangingPunct="1">
+                <a:lnSpc>
+                  <a:spcPct val="90000"/>
+                </a:lnSpc>
+                <a:spcBef>
+                  <a:spcPts val="500"/>
+                </a:spcBef>
+                <a:buFont typeface="Arial" panose="020B0604020202020204" pitchFamily="34" charset="0"/>
+                <a:buChar char="•"/>
+                <a:defRPr sz="1800" kern="1200">
+                  <a:solidFill>
+                    <a:schemeClr val="tx1"/>
+                  </a:solidFill>
+                  <a:latin typeface="+mn-lt"/>
+                  <a:ea typeface="+mn-ea"/>
+                  <a:cs typeface="+mn-cs"/>
+                </a:defRPr>
+              </a:lvl8pPr>
+              <a:lvl9pPr marL="3886200" indent="-228600" algn="l" defTabSz="914400" rtl="0" eaLnBrk="1" latinLnBrk="0" hangingPunct="1">
+                <a:lnSpc>
+                  <a:spcPct val="90000"/>
+                </a:lnSpc>
+                <a:spcBef>
+                  <a:spcPts val="500"/>
+                </a:spcBef>
+                <a:buFont typeface="Arial" panose="020B0604020202020204" pitchFamily="34" charset="0"/>
+                <a:buChar char="•"/>
+                <a:defRPr sz="1800" kern="1200">
+                  <a:solidFill>
+                    <a:schemeClr val="tx1"/>
+                  </a:solidFill>
+                  <a:latin typeface="+mn-lt"/>
+                  <a:ea typeface="+mn-ea"/>
+                  <a:cs typeface="+mn-cs"/>
+                </a:defRPr>
+              </a:lvl9pPr>
+            </a:lstStyle>
+            <a:p>
+              <a:pPr marL="0" indent="0">
+                <a:buNone/>
+              </a:pPr>
+              <a:endParaRPr lang="en-GB" sz="2000" dirty="0" smtClean="0"/>
+            </a:p>
+            <a:p>
+              <a:pPr marL="0" indent="0">
+                <a:buFont typeface="Arial" panose="020B0604020202020204" pitchFamily="34" charset="0"/>
+                <a:buNone/>
+              </a:pPr>
+              <a:endParaRPr lang="en-GB" sz="2000" dirty="0" smtClean="0"/>
+            </a:p>
+            <a:p>
+              <a:pPr marL="0" indent="0">
+                <a:buFont typeface="Arial" panose="020B0604020202020204" pitchFamily="34" charset="0"/>
+                <a:buNone/>
+              </a:pPr>
+              <a:endParaRPr lang="en-US" sz="2000" dirty="0"/>
+            </a:p>
+          </p:txBody>
+        </p:sp>
+        <p:pic>
+          <p:nvPicPr>
+            <p:cNvPr id="1026" name="Picture 2" descr="Image result for CLIMATE CHANGE"/>
+            <p:cNvPicPr>
+              <a:picLocks noChangeAspect="1" noChangeArrowheads="1"/>
+            </p:cNvPicPr>
+            <p:nvPr/>
+          </p:nvPicPr>
+          <p:blipFill>
+            <a:blip r:embed="rId2" cstate="print">
+              <a:extLst>
+                <a:ext uri="{28A0092B-C50C-407E-A947-70E740481C1C}">
+                  <a14:useLocalDpi xmlns:a14="http://schemas.microsoft.com/office/drawing/2010/main" val="0"/>
+                </a:ext>
+              </a:extLst>
+            </a:blip>
+            <a:srcRect/>
+            <a:stretch>
+              <a:fillRect/>
+            </a:stretch>
+          </p:blipFill>
+          <p:spPr bwMode="auto">
+            <a:xfrm>
+              <a:off x="5624528" y="556863"/>
+              <a:ext cx="3045015" cy="1712821"/>
+            </a:xfrm>
+            <a:prstGeom prst="rect">
+              <a:avLst/>
+            </a:prstGeom>
+            <a:noFill/>
             <a:extLst>
-              <a:ext uri="{28A0092B-C50C-407E-A947-70E740481C1C}">
-                <a14:useLocalDpi xmlns:a14="http://schemas.microsoft.com/office/drawing/2010/main" val="0"/>
+              <a:ext uri="{909E8E84-426E-40DD-AFC4-6F175D3DCCD1}">
+                <a14:hiddenFill xmlns:a14="http://schemas.microsoft.com/office/drawing/2010/main">
+                  <a:solidFill>
+                    <a:srgbClr val="FFFFFF"/>
+                  </a:solidFill>
+                </a14:hiddenFill>
               </a:ext>
             </a:extLst>
-          </a:blip>
-          <a:srcRect/>
-          <a:stretch>
-            <a:fillRect/>
-          </a:stretch>
-        </p:blipFill>
-        <p:spPr bwMode="auto">
-          <a:xfrm>
-            <a:off x="6130833" y="424970"/>
-            <a:ext cx="3045015" cy="1712821"/>
-          </a:xfrm>
-          <a:prstGeom prst="rect">
-            <a:avLst/>
-          </a:prstGeom>
-          <a:noFill/>
-          <a:extLst>
-            <a:ext uri="{909E8E84-426E-40DD-AFC4-6F175D3DCCD1}">
-              <a14:hiddenFill xmlns:a14="http://schemas.microsoft.com/office/drawing/2010/main">
-                <a:solidFill>
-                  <a:srgbClr val="FFFFFF"/>
-                </a:solidFill>
-              </a14:hiddenFill>
-            </a:ext>
-          </a:extLst>
-        </p:spPr>
-      </p:pic>
-      <p:pic>
-        <p:nvPicPr>
-          <p:cNvPr id="1028" name="Picture 4" descr="Image result for CLIMATE CHANGE"/>
-          <p:cNvPicPr>
-            <a:picLocks noChangeAspect="1" noChangeArrowheads="1"/>
-          </p:cNvPicPr>
-          <p:nvPr/>
-        </p:nvPicPr>
-        <p:blipFill>
-          <a:blip r:embed="rId3" cstate="print">
+          </p:spPr>
+        </p:pic>
+        <p:pic>
+          <p:nvPicPr>
+            <p:cNvPr id="1028" name="Picture 4" descr="Image result for CLIMATE CHANGE"/>
+            <p:cNvPicPr>
+              <a:picLocks noChangeAspect="1" noChangeArrowheads="1"/>
+            </p:cNvPicPr>
+            <p:nvPr/>
+          </p:nvPicPr>
+          <p:blipFill>
+            <a:blip r:embed="rId3" cstate="print">
+              <a:extLst>
+                <a:ext uri="{28A0092B-C50C-407E-A947-70E740481C1C}">
+                  <a14:useLocalDpi xmlns:a14="http://schemas.microsoft.com/office/drawing/2010/main" val="0"/>
+                </a:ext>
+              </a:extLst>
+            </a:blip>
+            <a:srcRect/>
+            <a:stretch>
+              <a:fillRect/>
+            </a:stretch>
+          </p:blipFill>
+          <p:spPr bwMode="auto">
+            <a:xfrm>
+              <a:off x="5808891" y="2317298"/>
+              <a:ext cx="3045015" cy="2029503"/>
+            </a:xfrm>
+            <a:prstGeom prst="rect">
+              <a:avLst/>
+            </a:prstGeom>
+            <a:noFill/>
             <a:extLst>
-              <a:ext uri="{28A0092B-C50C-407E-A947-70E740481C1C}">
-                <a14:useLocalDpi xmlns:a14="http://schemas.microsoft.com/office/drawing/2010/main" val="0"/>
+              <a:ext uri="{909E8E84-426E-40DD-AFC4-6F175D3DCCD1}">
+                <a14:hiddenFill xmlns:a14="http://schemas.microsoft.com/office/drawing/2010/main">
+                  <a:solidFill>
+                    <a:srgbClr val="FFFFFF"/>
+                  </a:solidFill>
+                </a14:hiddenFill>
               </a:ext>
             </a:extLst>
-          </a:blip>
-          <a:srcRect/>
-          <a:stretch>
-            <a:fillRect/>
-          </a:stretch>
-        </p:blipFill>
-        <p:spPr bwMode="auto">
-          <a:xfrm>
-            <a:off x="6130833" y="2197636"/>
-            <a:ext cx="3045015" cy="2029503"/>
-          </a:xfrm>
-          <a:prstGeom prst="rect">
-            <a:avLst/>
-          </a:prstGeom>
-          <a:noFill/>
-          <a:extLst>
-            <a:ext uri="{909E8E84-426E-40DD-AFC4-6F175D3DCCD1}">
-              <a14:hiddenFill xmlns:a14="http://schemas.microsoft.com/office/drawing/2010/main">
-                <a:solidFill>
-                  <a:srgbClr val="FFFFFF"/>
-                </a:solidFill>
-              </a14:hiddenFill>
-            </a:ext>
-          </a:extLst>
-        </p:spPr>
-      </p:pic>
-      <p:pic>
-        <p:nvPicPr>
-          <p:cNvPr id="1030" name="Picture 6" descr="Image result for CLIMATE CHANGE"/>
-          <p:cNvPicPr>
-            <a:picLocks noChangeAspect="1" noChangeArrowheads="1"/>
-          </p:cNvPicPr>
-          <p:nvPr/>
-        </p:nvPicPr>
-        <p:blipFill>
-          <a:blip r:embed="rId4" cstate="print">
+          </p:spPr>
+        </p:pic>
+        <p:pic>
+          <p:nvPicPr>
+            <p:cNvPr id="1030" name="Picture 6" descr="Image result for CLIMATE CHANGE"/>
+            <p:cNvPicPr>
+              <a:picLocks noChangeAspect="1" noChangeArrowheads="1"/>
+            </p:cNvPicPr>
+            <p:nvPr/>
+          </p:nvPicPr>
+          <p:blipFill>
+            <a:blip r:embed="rId4" cstate="print">
+              <a:extLst>
+                <a:ext uri="{28A0092B-C50C-407E-A947-70E740481C1C}">
+                  <a14:useLocalDpi xmlns:a14="http://schemas.microsoft.com/office/drawing/2010/main" val="0"/>
+                </a:ext>
+              </a:extLst>
+            </a:blip>
+            <a:srcRect/>
+            <a:stretch>
+              <a:fillRect/>
+            </a:stretch>
+          </p:blipFill>
+          <p:spPr bwMode="auto">
+            <a:xfrm>
+              <a:off x="5165082" y="4026568"/>
+              <a:ext cx="2102781" cy="2102781"/>
+            </a:xfrm>
+            <a:prstGeom prst="rect">
+              <a:avLst/>
+            </a:prstGeom>
+            <a:noFill/>
             <a:extLst>
-              <a:ext uri="{28A0092B-C50C-407E-A947-70E740481C1C}">
-                <a14:useLocalDpi xmlns:a14="http://schemas.microsoft.com/office/drawing/2010/main" val="0"/>
+              <a:ext uri="{909E8E84-426E-40DD-AFC4-6F175D3DCCD1}">
+                <a14:hiddenFill xmlns:a14="http://schemas.microsoft.com/office/drawing/2010/main">
+                  <a:solidFill>
+                    <a:srgbClr val="FFFFFF"/>
+                  </a:solidFill>
+                </a14:hiddenFill>
               </a:ext>
             </a:extLst>
-          </a:blip>
-          <a:srcRect/>
-          <a:stretch>
-            <a:fillRect/>
-          </a:stretch>
-        </p:blipFill>
-        <p:spPr bwMode="auto">
-          <a:xfrm>
-            <a:off x="9210682" y="424970"/>
-            <a:ext cx="2214495" cy="2214495"/>
-          </a:xfrm>
-          <a:prstGeom prst="rect">
-            <a:avLst/>
-          </a:prstGeom>
-          <a:noFill/>
-          <a:extLst>
-            <a:ext uri="{909E8E84-426E-40DD-AFC4-6F175D3DCCD1}">
-              <a14:hiddenFill xmlns:a14="http://schemas.microsoft.com/office/drawing/2010/main">
-                <a:solidFill>
-                  <a:srgbClr val="FFFFFF"/>
-                </a:solidFill>
-              </a14:hiddenFill>
-            </a:ext>
-          </a:extLst>
-        </p:spPr>
-      </p:pic>
-      <p:pic>
-        <p:nvPicPr>
-          <p:cNvPr id="1032" name="Picture 8" descr="Image result for CLIMATE CHANGE trump"/>
-          <p:cNvPicPr>
-            <a:picLocks noChangeAspect="1" noChangeArrowheads="1"/>
-          </p:cNvPicPr>
-          <p:nvPr/>
-        </p:nvPicPr>
-        <p:blipFill rotWithShape="1">
-          <a:blip r:embed="rId5">
+          </p:spPr>
+        </p:pic>
+        <p:pic>
+          <p:nvPicPr>
+            <p:cNvPr id="1032" name="Picture 8" descr="Image result for CLIMATE CHANGE trump"/>
+            <p:cNvPicPr>
+              <a:picLocks noChangeAspect="1" noChangeArrowheads="1"/>
+            </p:cNvPicPr>
+            <p:nvPr/>
+          </p:nvPicPr>
+          <p:blipFill rotWithShape="1">
+            <a:blip r:embed="rId5">
+              <a:extLst>
+                <a:ext uri="{28A0092B-C50C-407E-A947-70E740481C1C}">
+                  <a14:useLocalDpi xmlns:a14="http://schemas.microsoft.com/office/drawing/2010/main" val="0"/>
+                </a:ext>
+              </a:extLst>
+            </a:blip>
+            <a:srcRect l="4680" t="4290" r="5561" b="28446"/>
+            <a:stretch/>
+          </p:blipFill>
+          <p:spPr bwMode="auto">
+            <a:xfrm>
+              <a:off x="7350174" y="4440241"/>
+              <a:ext cx="4186273" cy="1618008"/>
+            </a:xfrm>
+            <a:prstGeom prst="rect">
+              <a:avLst/>
+            </a:prstGeom>
+            <a:noFill/>
+            <a:ln w="6350">
+              <a:solidFill>
+                <a:schemeClr val="tx1"/>
+              </a:solidFill>
+            </a:ln>
             <a:extLst>
-              <a:ext uri="{28A0092B-C50C-407E-A947-70E740481C1C}">
-                <a14:useLocalDpi xmlns:a14="http://schemas.microsoft.com/office/drawing/2010/main" val="0"/>
+              <a:ext uri="{909E8E84-426E-40DD-AFC4-6F175D3DCCD1}">
+                <a14:hiddenFill xmlns:a14="http://schemas.microsoft.com/office/drawing/2010/main">
+                  <a:solidFill>
+                    <a:srgbClr val="FFFFFF"/>
+                  </a:solidFill>
+                </a14:hiddenFill>
               </a:ext>
             </a:extLst>
-          </a:blip>
-          <a:srcRect b="24462"/>
-          <a:stretch/>
-        </p:blipFill>
-        <p:spPr bwMode="auto">
-          <a:xfrm>
-            <a:off x="6130833" y="4286984"/>
-            <a:ext cx="5294344" cy="2062630"/>
-          </a:xfrm>
-          <a:prstGeom prst="rect">
-            <a:avLst/>
-          </a:prstGeom>
-          <a:noFill/>
-          <a:ln w="6350">
-            <a:solidFill>
-              <a:schemeClr val="tx1"/>
-            </a:solidFill>
-          </a:ln>
-          <a:extLst>
-            <a:ext uri="{909E8E84-426E-40DD-AFC4-6F175D3DCCD1}">
-              <a14:hiddenFill xmlns:a14="http://schemas.microsoft.com/office/drawing/2010/main">
-                <a:solidFill>
-                  <a:srgbClr val="FFFFFF"/>
-                </a:solidFill>
-              </a14:hiddenFill>
-            </a:ext>
-          </a:extLst>
-        </p:spPr>
-      </p:pic>
+          </p:spPr>
+        </p:pic>
+        <p:pic>
+          <p:nvPicPr>
+            <p:cNvPr id="1034" name="Picture 10" descr="Image result for global warming politics"/>
+            <p:cNvPicPr>
+              <a:picLocks noChangeAspect="1" noChangeArrowheads="1"/>
+            </p:cNvPicPr>
+            <p:nvPr/>
+          </p:nvPicPr>
+          <p:blipFill>
+            <a:blip r:embed="rId6">
+              <a:extLst>
+                <a:ext uri="{28A0092B-C50C-407E-A947-70E740481C1C}">
+                  <a14:useLocalDpi xmlns:a14="http://schemas.microsoft.com/office/drawing/2010/main" val="0"/>
+                </a:ext>
+              </a:extLst>
+            </a:blip>
+            <a:srcRect/>
+            <a:stretch>
+              <a:fillRect/>
+            </a:stretch>
+          </p:blipFill>
+          <p:spPr bwMode="auto">
+            <a:xfrm>
+              <a:off x="8719390" y="457086"/>
+              <a:ext cx="2550124" cy="2014599"/>
+            </a:xfrm>
+            <a:prstGeom prst="rect">
+              <a:avLst/>
+            </a:prstGeom>
+            <a:noFill/>
+            <a:extLst>
+              <a:ext uri="{909E8E84-426E-40DD-AFC4-6F175D3DCCD1}">
+                <a14:hiddenFill xmlns:a14="http://schemas.microsoft.com/office/drawing/2010/main">
+                  <a:solidFill>
+                    <a:srgbClr val="FFFFFF"/>
+                  </a:solidFill>
+                </a14:hiddenFill>
+              </a:ext>
+            </a:extLst>
+          </p:spPr>
+        </p:pic>
+        <p:pic>
+          <p:nvPicPr>
+            <p:cNvPr id="1036" name="Picture 12" descr="Image result for global warming"/>
+            <p:cNvPicPr>
+              <a:picLocks noChangeAspect="1" noChangeArrowheads="1"/>
+            </p:cNvPicPr>
+            <p:nvPr/>
+          </p:nvPicPr>
+          <p:blipFill>
+            <a:blip r:embed="rId7" cstate="print">
+              <a:extLst>
+                <a:ext uri="{28A0092B-C50C-407E-A947-70E740481C1C}">
+                  <a14:useLocalDpi xmlns:a14="http://schemas.microsoft.com/office/drawing/2010/main" val="0"/>
+                </a:ext>
+              </a:extLst>
+            </a:blip>
+            <a:srcRect/>
+            <a:stretch>
+              <a:fillRect/>
+            </a:stretch>
+          </p:blipFill>
+          <p:spPr bwMode="auto">
+            <a:xfrm>
+              <a:off x="8508052" y="2516637"/>
+              <a:ext cx="3092328" cy="1740258"/>
+            </a:xfrm>
+            <a:prstGeom prst="rect">
+              <a:avLst/>
+            </a:prstGeom>
+            <a:noFill/>
+            <a:extLst>
+              <a:ext uri="{909E8E84-426E-40DD-AFC4-6F175D3DCCD1}">
+                <a14:hiddenFill xmlns:a14="http://schemas.microsoft.com/office/drawing/2010/main">
+                  <a:solidFill>
+                    <a:srgbClr val="FFFFFF"/>
+                  </a:solidFill>
+                </a14:hiddenFill>
+              </a:ext>
+            </a:extLst>
+          </p:spPr>
+        </p:pic>
+      </p:grpSp>
     </p:spTree>
     <p:extLst>
       <p:ext uri="{BB962C8B-B14F-4D97-AF65-F5344CB8AC3E}">
@@ -6207,7 +6311,7 @@
           <p:nvPr>
             <p:extLst>
               <p:ext uri="{D42A27DB-BD31-4B8C-83A1-F6EECF244321}">
-                <p14:modId xmlns:p14="http://schemas.microsoft.com/office/powerpoint/2010/main" val="2636566565"/>
+                <p14:modId xmlns:p14="http://schemas.microsoft.com/office/powerpoint/2010/main" val="2348478559"/>
               </p:ext>
             </p:extLst>
           </p:nvPr>
@@ -6265,32 +6369,42 @@
                   </a:txBody>
                   <a:tcPr anchor="ctr">
                     <a:lnL w="12700" cap="flat" cmpd="sng" algn="ctr">
-                      <a:solidFill>
-                        <a:schemeClr val="tx1"/>
-                      </a:solidFill>
+                      <a:noFill/>
                       <a:prstDash val="solid"/>
                       <a:round/>
                       <a:headEnd type="none" w="med" len="med"/>
                       <a:tailEnd type="none" w="med" len="med"/>
                     </a:lnL>
+                    <a:lnR>
+                      <a:noFill/>
+                    </a:lnR>
                     <a:lnT w="12700" cap="flat" cmpd="sng" algn="ctr">
-                      <a:solidFill>
-                        <a:schemeClr val="tx1"/>
-                      </a:solidFill>
+                      <a:noFill/>
                       <a:prstDash val="solid"/>
                       <a:round/>
                       <a:headEnd type="none" w="med" len="med"/>
                       <a:tailEnd type="none" w="med" len="med"/>
                     </a:lnT>
                     <a:lnB w="12700" cap="flat" cmpd="sng" algn="ctr">
-                      <a:solidFill>
-                        <a:schemeClr val="tx1"/>
-                      </a:solidFill>
+                      <a:noFill/>
                       <a:prstDash val="solid"/>
                       <a:round/>
                       <a:headEnd type="none" w="med" len="med"/>
                       <a:tailEnd type="none" w="med" len="med"/>
                     </a:lnB>
+                    <a:lnTlToBr w="12700" cmpd="sng">
+                      <a:noFill/>
+                      <a:prstDash val="solid"/>
+                    </a:lnTlToBr>
+                    <a:lnBlToTr w="12700" cmpd="sng">
+                      <a:noFill/>
+                      <a:prstDash val="solid"/>
+                    </a:lnBlToTr>
+                    <a:solidFill>
+                      <a:schemeClr val="accent5">
+                        <a:lumMod val="50000"/>
+                      </a:schemeClr>
+                    </a:solidFill>
                   </a:tcPr>
                 </a:tc>
                 <a:tc>
@@ -6307,24 +6421,39 @@
                     </a:p>
                   </a:txBody>
                   <a:tcPr anchor="ctr">
+                    <a:lnL>
+                      <a:noFill/>
+                    </a:lnL>
+                    <a:lnR>
+                      <a:noFill/>
+                    </a:lnR>
                     <a:lnT w="12700" cap="flat" cmpd="sng" algn="ctr">
-                      <a:solidFill>
-                        <a:schemeClr val="tx1"/>
-                      </a:solidFill>
+                      <a:noFill/>
                       <a:prstDash val="solid"/>
                       <a:round/>
                       <a:headEnd type="none" w="med" len="med"/>
                       <a:tailEnd type="none" w="med" len="med"/>
                     </a:lnT>
                     <a:lnB w="12700" cap="flat" cmpd="sng" algn="ctr">
-                      <a:solidFill>
-                        <a:schemeClr val="tx1"/>
-                      </a:solidFill>
+                      <a:noFill/>
                       <a:prstDash val="solid"/>
                       <a:round/>
                       <a:headEnd type="none" w="med" len="med"/>
                       <a:tailEnd type="none" w="med" len="med"/>
                     </a:lnB>
+                    <a:lnTlToBr w="12700" cmpd="sng">
+                      <a:noFill/>
+                      <a:prstDash val="solid"/>
+                    </a:lnTlToBr>
+                    <a:lnBlToTr w="12700" cmpd="sng">
+                      <a:noFill/>
+                      <a:prstDash val="solid"/>
+                    </a:lnBlToTr>
+                    <a:solidFill>
+                      <a:schemeClr val="accent5">
+                        <a:lumMod val="50000"/>
+                      </a:schemeClr>
+                    </a:solidFill>
                   </a:tcPr>
                 </a:tc>
                 <a:tc>
@@ -6341,33 +6470,43 @@
                     </a:p>
                   </a:txBody>
                   <a:tcPr anchor="ctr">
+                    <a:lnL>
+                      <a:noFill/>
+                    </a:lnL>
                     <a:lnR w="12700" cap="flat" cmpd="sng" algn="ctr">
-                      <a:solidFill>
-                        <a:schemeClr val="tx1"/>
-                      </a:solidFill>
+                      <a:noFill/>
                       <a:prstDash val="solid"/>
                       <a:round/>
                       <a:headEnd type="none" w="med" len="med"/>
                       <a:tailEnd type="none" w="med" len="med"/>
                     </a:lnR>
                     <a:lnT w="12700" cap="flat" cmpd="sng" algn="ctr">
-                      <a:solidFill>
-                        <a:schemeClr val="tx1"/>
-                      </a:solidFill>
+                      <a:noFill/>
                       <a:prstDash val="solid"/>
                       <a:round/>
                       <a:headEnd type="none" w="med" len="med"/>
                       <a:tailEnd type="none" w="med" len="med"/>
                     </a:lnT>
                     <a:lnB w="12700" cap="flat" cmpd="sng" algn="ctr">
-                      <a:solidFill>
-                        <a:schemeClr val="tx1"/>
-                      </a:solidFill>
+                      <a:noFill/>
                       <a:prstDash val="solid"/>
                       <a:round/>
                       <a:headEnd type="none" w="med" len="med"/>
                       <a:tailEnd type="none" w="med" len="med"/>
                     </a:lnB>
+                    <a:lnTlToBr w="12700" cmpd="sng">
+                      <a:noFill/>
+                      <a:prstDash val="solid"/>
+                    </a:lnTlToBr>
+                    <a:lnBlToTr w="12700" cmpd="sng">
+                      <a:noFill/>
+                      <a:prstDash val="solid"/>
+                    </a:lnBlToTr>
+                    <a:solidFill>
+                      <a:schemeClr val="accent5">
+                        <a:lumMod val="50000"/>
+                      </a:schemeClr>
+                    </a:solidFill>
                   </a:tcPr>
                 </a:tc>
                 <a:extLst>
@@ -6404,9 +6543,7 @@
                   </a:txBody>
                   <a:tcPr>
                     <a:lnL w="12700" cap="flat" cmpd="sng" algn="ctr">
-                      <a:solidFill>
-                        <a:schemeClr val="tx1"/>
-                      </a:solidFill>
+                      <a:noFill/>
                       <a:prstDash val="solid"/>
                       <a:round/>
                       <a:headEnd type="none" w="med" len="med"/>
@@ -6416,9 +6553,7 @@
                       <a:noFill/>
                     </a:lnR>
                     <a:lnT w="12700" cap="flat" cmpd="sng" algn="ctr">
-                      <a:solidFill>
-                        <a:schemeClr val="tx1"/>
-                      </a:solidFill>
+                      <a:noFill/>
                       <a:prstDash val="solid"/>
                       <a:round/>
                       <a:headEnd type="none" w="med" len="med"/>
@@ -6459,9 +6594,7 @@
                       <a:noFill/>
                     </a:lnR>
                     <a:lnT w="12700" cap="flat" cmpd="sng" algn="ctr">
-                      <a:solidFill>
-                        <a:schemeClr val="tx1"/>
-                      </a:solidFill>
+                      <a:noFill/>
                       <a:prstDash val="solid"/>
                       <a:round/>
                       <a:headEnd type="none" w="med" len="med"/>
@@ -6512,18 +6645,14 @@
                       <a:noFill/>
                     </a:lnL>
                     <a:lnR w="12700" cap="flat" cmpd="sng" algn="ctr">
-                      <a:solidFill>
-                        <a:schemeClr val="tx1"/>
-                      </a:solidFill>
+                      <a:noFill/>
                       <a:prstDash val="solid"/>
                       <a:round/>
                       <a:headEnd type="none" w="med" len="med"/>
                       <a:tailEnd type="none" w="med" len="med"/>
                     </a:lnR>
                     <a:lnT w="12700" cap="flat" cmpd="sng" algn="ctr">
-                      <a:solidFill>
-                        <a:schemeClr val="tx1"/>
-                      </a:solidFill>
+                      <a:noFill/>
                       <a:prstDash val="solid"/>
                       <a:round/>
                       <a:headEnd type="none" w="med" len="med"/>
@@ -6606,9 +6735,7 @@
                   </a:txBody>
                   <a:tcPr>
                     <a:lnL w="12700" cap="flat" cmpd="sng" algn="ctr">
-                      <a:solidFill>
-                        <a:schemeClr val="tx1"/>
-                      </a:solidFill>
+                      <a:noFill/>
                       <a:prstDash val="solid"/>
                       <a:round/>
                       <a:headEnd type="none" w="med" len="med"/>
@@ -6623,9 +6750,7 @@
                       <a:miter lim="800000"/>
                     </a:lnT>
                     <a:lnB w="12700" cap="flat" cmpd="sng" algn="ctr">
-                      <a:solidFill>
-                        <a:schemeClr val="tx1"/>
-                      </a:solidFill>
+                      <a:noFill/>
                       <a:prstDash val="solid"/>
                       <a:round/>
                       <a:headEnd type="none" w="med" len="med"/>
@@ -6690,9 +6815,7 @@
                       <a:miter lim="800000"/>
                     </a:lnT>
                     <a:lnB w="12700" cap="flat" cmpd="sng" algn="ctr">
-                      <a:solidFill>
-                        <a:schemeClr val="tx1"/>
-                      </a:solidFill>
+                      <a:noFill/>
                       <a:prstDash val="solid"/>
                       <a:round/>
                       <a:headEnd type="none" w="med" len="med"/>
@@ -6762,9 +6885,7 @@
                       <a:noFill/>
                     </a:lnL>
                     <a:lnR w="12700" cap="flat" cmpd="sng" algn="ctr">
-                      <a:solidFill>
-                        <a:schemeClr val="tx1"/>
-                      </a:solidFill>
+                      <a:noFill/>
                       <a:prstDash val="solid"/>
                       <a:round/>
                       <a:headEnd type="none" w="med" len="med"/>
@@ -6776,9 +6897,7 @@
                       <a:miter lim="800000"/>
                     </a:lnT>
                     <a:lnB w="12700" cap="flat" cmpd="sng" algn="ctr">
-                      <a:solidFill>
-                        <a:schemeClr val="tx1"/>
-                      </a:solidFill>
+                      <a:noFill/>
                       <a:prstDash val="solid"/>
                       <a:round/>
                       <a:headEnd type="none" w="med" len="med"/>
@@ -6813,7 +6932,7 @@
           <p:nvPr>
             <p:extLst>
               <p:ext uri="{D42A27DB-BD31-4B8C-83A1-F6EECF244321}">
-                <p14:modId xmlns:p14="http://schemas.microsoft.com/office/powerpoint/2010/main" val="1976954128"/>
+                <p14:modId xmlns:p14="http://schemas.microsoft.com/office/powerpoint/2010/main" val="3629425311"/>
               </p:ext>
             </p:extLst>
           </p:nvPr>
@@ -6866,15 +6985,39 @@
                     </a:p>
                   </a:txBody>
                   <a:tcPr anchor="ctr">
+                    <a:lnL w="6350" cap="flat" cmpd="sng" algn="ctr">
+                      <a:noFill/>
+                      <a:prstDash val="solid"/>
+                      <a:miter lim="800000"/>
+                    </a:lnL>
+                    <a:lnR>
+                      <a:noFill/>
+                    </a:lnR>
+                    <a:lnT w="6350" cap="flat" cmpd="sng" algn="ctr">
+                      <a:noFill/>
+                      <a:prstDash val="solid"/>
+                      <a:miter lim="800000"/>
+                    </a:lnT>
                     <a:lnB w="12700" cap="flat" cmpd="sng" algn="ctr">
-                      <a:solidFill>
-                        <a:schemeClr val="tx1"/>
-                      </a:solidFill>
+                      <a:noFill/>
                       <a:prstDash val="solid"/>
                       <a:round/>
                       <a:headEnd type="none" w="med" len="med"/>
                       <a:tailEnd type="none" w="med" len="med"/>
                     </a:lnB>
+                    <a:lnTlToBr w="12700" cmpd="sng">
+                      <a:noFill/>
+                      <a:prstDash val="solid"/>
+                    </a:lnTlToBr>
+                    <a:lnBlToTr w="12700" cmpd="sng">
+                      <a:noFill/>
+                      <a:prstDash val="solid"/>
+                    </a:lnBlToTr>
+                    <a:solidFill>
+                      <a:schemeClr val="accent5">
+                        <a:lumMod val="50000"/>
+                      </a:schemeClr>
+                    </a:solidFill>
                   </a:tcPr>
                 </a:tc>
                 <a:tc>
@@ -6891,15 +7034,37 @@
                     </a:p>
                   </a:txBody>
                   <a:tcPr anchor="ctr">
+                    <a:lnL>
+                      <a:noFill/>
+                    </a:lnL>
+                    <a:lnR>
+                      <a:noFill/>
+                    </a:lnR>
+                    <a:lnT w="6350" cap="flat" cmpd="sng" algn="ctr">
+                      <a:noFill/>
+                      <a:prstDash val="solid"/>
+                      <a:miter lim="800000"/>
+                    </a:lnT>
                     <a:lnB w="12700" cap="flat" cmpd="sng" algn="ctr">
-                      <a:solidFill>
-                        <a:schemeClr val="tx1"/>
-                      </a:solidFill>
+                      <a:noFill/>
                       <a:prstDash val="solid"/>
                       <a:round/>
                       <a:headEnd type="none" w="med" len="med"/>
                       <a:tailEnd type="none" w="med" len="med"/>
                     </a:lnB>
+                    <a:lnTlToBr w="12700" cmpd="sng">
+                      <a:noFill/>
+                      <a:prstDash val="solid"/>
+                    </a:lnTlToBr>
+                    <a:lnBlToTr w="12700" cmpd="sng">
+                      <a:noFill/>
+                      <a:prstDash val="solid"/>
+                    </a:lnBlToTr>
+                    <a:solidFill>
+                      <a:schemeClr val="accent5">
+                        <a:lumMod val="50000"/>
+                      </a:schemeClr>
+                    </a:solidFill>
                   </a:tcPr>
                 </a:tc>
                 <a:tc>
@@ -6916,15 +7081,39 @@
                     </a:p>
                   </a:txBody>
                   <a:tcPr anchor="ctr">
+                    <a:lnL>
+                      <a:noFill/>
+                    </a:lnL>
+                    <a:lnR w="6350" cap="flat" cmpd="sng" algn="ctr">
+                      <a:noFill/>
+                      <a:prstDash val="solid"/>
+                      <a:miter lim="800000"/>
+                    </a:lnR>
+                    <a:lnT w="6350" cap="flat" cmpd="sng" algn="ctr">
+                      <a:noFill/>
+                      <a:prstDash val="solid"/>
+                      <a:miter lim="800000"/>
+                    </a:lnT>
                     <a:lnB w="12700" cap="flat" cmpd="sng" algn="ctr">
-                      <a:solidFill>
-                        <a:schemeClr val="tx1"/>
-                      </a:solidFill>
+                      <a:noFill/>
                       <a:prstDash val="solid"/>
                       <a:round/>
                       <a:headEnd type="none" w="med" len="med"/>
                       <a:tailEnd type="none" w="med" len="med"/>
                     </a:lnB>
+                    <a:lnTlToBr w="12700" cmpd="sng">
+                      <a:noFill/>
+                      <a:prstDash val="solid"/>
+                    </a:lnTlToBr>
+                    <a:lnBlToTr w="12700" cmpd="sng">
+                      <a:noFill/>
+                      <a:prstDash val="solid"/>
+                    </a:lnBlToTr>
+                    <a:solidFill>
+                      <a:schemeClr val="accent5">
+                        <a:lumMod val="50000"/>
+                      </a:schemeClr>
+                    </a:solidFill>
                   </a:tcPr>
                 </a:tc>
                 <a:extLst>
@@ -6961,9 +7150,7 @@
                   </a:txBody>
                   <a:tcPr>
                     <a:lnL w="12700" cap="flat" cmpd="sng" algn="ctr">
-                      <a:solidFill>
-                        <a:schemeClr val="tx1"/>
-                      </a:solidFill>
+                      <a:noFill/>
                       <a:prstDash val="solid"/>
                       <a:round/>
                       <a:headEnd type="none" w="med" len="med"/>
@@ -6973,9 +7160,7 @@
                       <a:noFill/>
                     </a:lnR>
                     <a:lnT w="12700" cap="flat" cmpd="sng" algn="ctr">
-                      <a:solidFill>
-                        <a:schemeClr val="tx1"/>
-                      </a:solidFill>
+                      <a:noFill/>
                       <a:prstDash val="solid"/>
                       <a:round/>
                       <a:headEnd type="none" w="med" len="med"/>
@@ -7029,9 +7214,7 @@
                       <a:noFill/>
                     </a:lnR>
                     <a:lnT w="12700" cap="flat" cmpd="sng" algn="ctr">
-                      <a:solidFill>
-                        <a:schemeClr val="tx1"/>
-                      </a:solidFill>
+                      <a:noFill/>
                       <a:prstDash val="solid"/>
                       <a:round/>
                       <a:headEnd type="none" w="med" len="med"/>
@@ -7082,18 +7265,14 @@
                       <a:noFill/>
                     </a:lnL>
                     <a:lnR w="12700" cap="flat" cmpd="sng" algn="ctr">
-                      <a:solidFill>
-                        <a:schemeClr val="tx1"/>
-                      </a:solidFill>
+                      <a:noFill/>
                       <a:prstDash val="solid"/>
                       <a:round/>
                       <a:headEnd type="none" w="med" len="med"/>
                       <a:tailEnd type="none" w="med" len="med"/>
                     </a:lnR>
                     <a:lnT w="12700" cap="flat" cmpd="sng" algn="ctr">
-                      <a:solidFill>
-                        <a:schemeClr val="tx1"/>
-                      </a:solidFill>
+                      <a:noFill/>
                       <a:prstDash val="solid"/>
                       <a:round/>
                       <a:headEnd type="none" w="med" len="med"/>
@@ -7176,9 +7355,7 @@
                   </a:txBody>
                   <a:tcPr>
                     <a:lnL w="12700" cap="flat" cmpd="sng" algn="ctr">
-                      <a:solidFill>
-                        <a:schemeClr val="tx1"/>
-                      </a:solidFill>
+                      <a:noFill/>
                       <a:prstDash val="solid"/>
                       <a:round/>
                       <a:headEnd type="none" w="med" len="med"/>
@@ -7193,9 +7370,7 @@
                       <a:miter lim="800000"/>
                     </a:lnT>
                     <a:lnB w="12700" cap="flat" cmpd="sng" algn="ctr">
-                      <a:solidFill>
-                        <a:schemeClr val="tx1"/>
-                      </a:solidFill>
+                      <a:noFill/>
                       <a:prstDash val="solid"/>
                       <a:round/>
                       <a:headEnd type="none" w="med" len="med"/>
@@ -7273,9 +7448,7 @@
                       <a:miter lim="800000"/>
                     </a:lnT>
                     <a:lnB w="12700" cap="flat" cmpd="sng" algn="ctr">
-                      <a:solidFill>
-                        <a:schemeClr val="tx1"/>
-                      </a:solidFill>
+                      <a:noFill/>
                       <a:prstDash val="solid"/>
                       <a:round/>
                       <a:headEnd type="none" w="med" len="med"/>
@@ -7349,9 +7522,7 @@
                       <a:noFill/>
                     </a:lnL>
                     <a:lnR w="12700" cap="flat" cmpd="sng" algn="ctr">
-                      <a:solidFill>
-                        <a:schemeClr val="tx1"/>
-                      </a:solidFill>
+                      <a:noFill/>
                       <a:prstDash val="solid"/>
                       <a:round/>
                       <a:headEnd type="none" w="med" len="med"/>
@@ -7363,9 +7534,7 @@
                       <a:miter lim="800000"/>
                     </a:lnT>
                     <a:lnB w="12700" cap="flat" cmpd="sng" algn="ctr">
-                      <a:solidFill>
-                        <a:schemeClr val="tx1"/>
-                      </a:solidFill>
+                      <a:noFill/>
                       <a:prstDash val="solid"/>
                       <a:round/>
                       <a:headEnd type="none" w="med" len="med"/>

</xml_diff>